<commit_message>
Updated Presentation to include PCL Slide
</commit_message>
<xml_diff>
--- a/C Sharp Ecosystem - 2.3.2017/Csharp.pptx
+++ b/C Sharp Ecosystem - 2.3.2017/Csharp.pptx
@@ -5,7 +5,7 @@
     <p:sldMasterId id="2147483660" r:id="rId1"/>
   </p:sldMasterIdLst>
   <p:notesMasterIdLst>
-    <p:notesMasterId r:id="rId21"/>
+    <p:notesMasterId r:id="rId22"/>
   </p:notesMasterIdLst>
   <p:sldIdLst>
     <p:sldId id="256" r:id="rId2"/>
@@ -18,15 +18,16 @@
     <p:sldId id="283" r:id="rId9"/>
     <p:sldId id="284" r:id="rId10"/>
     <p:sldId id="297" r:id="rId11"/>
-    <p:sldId id="298" r:id="rId12"/>
-    <p:sldId id="275" r:id="rId13"/>
-    <p:sldId id="291" r:id="rId14"/>
-    <p:sldId id="292" r:id="rId15"/>
-    <p:sldId id="293" r:id="rId16"/>
-    <p:sldId id="294" r:id="rId17"/>
-    <p:sldId id="295" r:id="rId18"/>
-    <p:sldId id="296" r:id="rId19"/>
-    <p:sldId id="285" r:id="rId20"/>
+    <p:sldId id="299" r:id="rId12"/>
+    <p:sldId id="298" r:id="rId13"/>
+    <p:sldId id="275" r:id="rId14"/>
+    <p:sldId id="291" r:id="rId15"/>
+    <p:sldId id="292" r:id="rId16"/>
+    <p:sldId id="293" r:id="rId17"/>
+    <p:sldId id="294" r:id="rId18"/>
+    <p:sldId id="295" r:id="rId19"/>
+    <p:sldId id="296" r:id="rId20"/>
+    <p:sldId id="285" r:id="rId21"/>
   </p:sldIdLst>
   <p:sldSz cx="12192000" cy="6858000"/>
   <p:notesSz cx="6858000" cy="9144000"/>
@@ -215,7 +216,7 @@
           <a:p>
             <a:fld id="{A4893317-34FB-B640-9F06-398607167BC7}" type="datetimeFigureOut">
               <a:rPr lang="en-US" smtClean="0"/>
-              <a:t>2/2/2017</a:t>
+              <a:t>2/3/2017</a:t>
             </a:fld>
             <a:endParaRPr lang="en-US"/>
           </a:p>
@@ -5894,6 +5895,82 @@
           <a:p>
             <a:r>
               <a:rPr lang="en-US" dirty="0"/>
+              <a:t>Portable Class Library?</a:t>
+            </a:r>
+          </a:p>
+        </p:txBody>
+      </p:sp>
+      <p:pic>
+        <p:nvPicPr>
+          <p:cNvPr id="4" name="Picture 3"/>
+          <p:cNvPicPr>
+            <a:picLocks noChangeAspect="1"/>
+          </p:cNvPicPr>
+          <p:nvPr/>
+        </p:nvPicPr>
+        <p:blipFill>
+          <a:blip r:embed="rId2"/>
+          <a:stretch>
+            <a:fillRect/>
+          </a:stretch>
+        </p:blipFill>
+        <p:spPr>
+          <a:xfrm>
+            <a:off x="730851" y="1040412"/>
+            <a:ext cx="4057650" cy="4962525"/>
+          </a:xfrm>
+          <a:prstGeom prst="rect">
+            <a:avLst/>
+          </a:prstGeom>
+        </p:spPr>
+      </p:pic>
+    </p:spTree>
+    <p:extLst>
+      <p:ext uri="{BB962C8B-B14F-4D97-AF65-F5344CB8AC3E}">
+        <p14:creationId xmlns:p14="http://schemas.microsoft.com/office/powerpoint/2010/main" val="2084865415"/>
+      </p:ext>
+    </p:extLst>
+  </p:cSld>
+  <p:clrMapOvr>
+    <a:masterClrMapping/>
+  </p:clrMapOvr>
+</p:sld>
+</file>
+
+<file path=ppt/slides/slide12.xml><?xml version="1.0" encoding="utf-8"?>
+<p:sld xmlns:a="http://schemas.openxmlformats.org/drawingml/2006/main" xmlns:r="http://schemas.openxmlformats.org/officeDocument/2006/relationships" xmlns:p="http://schemas.openxmlformats.org/presentationml/2006/main">
+  <p:cSld>
+    <p:spTree>
+      <p:nvGrpSpPr>
+        <p:cNvPr id="1" name=""/>
+        <p:cNvGrpSpPr/>
+        <p:nvPr/>
+      </p:nvGrpSpPr>
+      <p:grpSpPr>
+        <a:xfrm>
+          <a:off x="0" y="0"/>
+          <a:ext cx="0" cy="0"/>
+          <a:chOff x="0" y="0"/>
+          <a:chExt cx="0" cy="0"/>
+        </a:xfrm>
+      </p:grpSpPr>
+      <p:sp>
+        <p:nvSpPr>
+          <p:cNvPr id="2" name="Title 1"/>
+          <p:cNvSpPr>
+            <a:spLocks noGrp="1"/>
+          </p:cNvSpPr>
+          <p:nvPr>
+            <p:ph type="title"/>
+          </p:nvPr>
+        </p:nvSpPr>
+        <p:spPr/>
+        <p:txBody>
+          <a:bodyPr/>
+          <a:lstStyle/>
+          <a:p>
+            <a:r>
+              <a:rPr lang="en-US" dirty="0"/>
               <a:t>.NET Standard Breakdown</a:t>
             </a:r>
           </a:p>
@@ -5921,7 +5998,7 @@
           <a:graphicData uri="http://schemas.openxmlformats.org/presentationml/2006/ole">
             <mc:AlternateContent xmlns:mc="http://schemas.openxmlformats.org/markup-compatibility/2006">
               <mc:Choice xmlns:v="urn:schemas-microsoft-com:vml" Requires="v">
-                <p:oleObj spid="_x0000_s1026" name="Image" r:id="rId3" imgW="10679040" imgH="6234840" progId="Photoshop.Image.18">
+                <p:oleObj spid="_x0000_s1030" name="Image" r:id="rId3" imgW="10679040" imgH="6234840" progId="Photoshop.Image.18">
                   <p:embed/>
                 </p:oleObj>
               </mc:Choice>
@@ -5969,63 +6046,6 @@
 </p:sld>
 </file>
 
-<file path=ppt/slides/slide12.xml><?xml version="1.0" encoding="utf-8"?>
-<p:sld xmlns:a="http://schemas.openxmlformats.org/drawingml/2006/main" xmlns:r="http://schemas.openxmlformats.org/officeDocument/2006/relationships" xmlns:p="http://schemas.openxmlformats.org/presentationml/2006/main">
-  <p:cSld>
-    <p:spTree>
-      <p:nvGrpSpPr>
-        <p:cNvPr id="1" name=""/>
-        <p:cNvGrpSpPr/>
-        <p:nvPr/>
-      </p:nvGrpSpPr>
-      <p:grpSpPr>
-        <a:xfrm>
-          <a:off x="0" y="0"/>
-          <a:ext cx="0" cy="0"/>
-          <a:chOff x="0" y="0"/>
-          <a:chExt cx="0" cy="0"/>
-        </a:xfrm>
-      </p:grpSpPr>
-      <p:sp>
-        <p:nvSpPr>
-          <p:cNvPr id="2" name="Title 1"/>
-          <p:cNvSpPr>
-            <a:spLocks noGrp="1"/>
-          </p:cNvSpPr>
-          <p:nvPr>
-            <p:ph type="title"/>
-          </p:nvPr>
-        </p:nvSpPr>
-        <p:spPr>
-          <a:xfrm>
-            <a:off x="744445" y="2806411"/>
-            <a:ext cx="9404351" cy="754063"/>
-          </a:xfrm>
-        </p:spPr>
-        <p:txBody>
-          <a:bodyPr/>
-          <a:lstStyle/>
-          <a:p>
-            <a:r>
-              <a:rPr lang="en-US" dirty="0"/>
-              <a:t>Platforms, Frameworks and Devices oh my…</a:t>
-            </a:r>
-          </a:p>
-        </p:txBody>
-      </p:sp>
-    </p:spTree>
-    <p:extLst>
-      <p:ext uri="{BB962C8B-B14F-4D97-AF65-F5344CB8AC3E}">
-        <p14:creationId xmlns:p14="http://schemas.microsoft.com/office/powerpoint/2010/main" val="529241155"/>
-      </p:ext>
-    </p:extLst>
-  </p:cSld>
-  <p:clrMapOvr>
-    <a:masterClrMapping/>
-  </p:clrMapOvr>
-</p:sld>
-</file>
-
 <file path=ppt/slides/slide13.xml><?xml version="1.0" encoding="utf-8"?>
 <p:sld xmlns:a="http://schemas.openxmlformats.org/drawingml/2006/main" xmlns:r="http://schemas.openxmlformats.org/officeDocument/2006/relationships" xmlns:p="http://schemas.openxmlformats.org/presentationml/2006/main">
   <p:cSld>
@@ -6053,123 +6073,19 @@
             <p:ph type="title"/>
           </p:nvPr>
         </p:nvSpPr>
-        <p:spPr/>
+        <p:spPr>
+          <a:xfrm>
+            <a:off x="744445" y="2806411"/>
+            <a:ext cx="9404351" cy="754063"/>
+          </a:xfrm>
+        </p:spPr>
         <p:txBody>
           <a:bodyPr/>
           <a:lstStyle/>
           <a:p>
             <a:r>
               <a:rPr lang="en-US" dirty="0"/>
-              <a:t>Web Applications</a:t>
-            </a:r>
-          </a:p>
-        </p:txBody>
-      </p:sp>
-      <p:sp>
-        <p:nvSpPr>
-          <p:cNvPr id="3" name="Content Placeholder 2"/>
-          <p:cNvSpPr>
-            <a:spLocks noGrp="1"/>
-          </p:cNvSpPr>
-          <p:nvPr>
-            <p:ph idx="1"/>
-          </p:nvPr>
-        </p:nvSpPr>
-        <p:spPr/>
-        <p:txBody>
-          <a:bodyPr/>
-          <a:lstStyle/>
-          <a:p>
-            <a:r>
-              <a:rPr lang="en-US" dirty="0"/>
-              <a:t>Two frameworks: ASP.NET WebForms and ASP.NET MVC</a:t>
-            </a:r>
-          </a:p>
-          <a:p>
-            <a:r>
-              <a:rPr lang="en-US" dirty="0"/>
-              <a:t>WebForms:</a:t>
-            </a:r>
-          </a:p>
-          <a:p>
-            <a:pPr lvl="1"/>
-            <a:r>
-              <a:rPr lang="en-US" dirty="0"/>
-              <a:t>Older, but quicker to jump into</a:t>
-            </a:r>
-          </a:p>
-          <a:p>
-            <a:pPr lvl="1"/>
-            <a:r>
-              <a:rPr lang="en-US" dirty="0"/>
-              <a:t>Structure:</a:t>
-            </a:r>
-          </a:p>
-          <a:p>
-            <a:pPr lvl="2"/>
-            <a:r>
-              <a:rPr lang="en-US" dirty="0"/>
-              <a:t>ASPX – Contains your CSS/JS/HTML/Server Controls</a:t>
-            </a:r>
-          </a:p>
-          <a:p>
-            <a:pPr lvl="2"/>
-            <a:r>
-              <a:rPr lang="en-US" dirty="0"/>
-              <a:t>ASPX.CS – Code behind for the page itself</a:t>
-            </a:r>
-          </a:p>
-          <a:p>
-            <a:r>
-              <a:rPr lang="en-US" dirty="0"/>
-              <a:t>MVC</a:t>
-            </a:r>
-          </a:p>
-          <a:p>
-            <a:pPr lvl="1"/>
-            <a:r>
-              <a:rPr lang="en-US" dirty="0"/>
-              <a:t>Newer, more time to get up and running</a:t>
-            </a:r>
-          </a:p>
-          <a:p>
-            <a:pPr lvl="1"/>
-            <a:r>
-              <a:rPr lang="en-US" dirty="0"/>
-              <a:t>Mobile and Device specific views as simple as:  </a:t>
-            </a:r>
-            <a:r>
-              <a:rPr lang="en-US" dirty="0" err="1"/>
-              <a:t>Index.mobile.cshtml</a:t>
-            </a:r>
-            <a:endParaRPr lang="en-US" dirty="0"/>
-          </a:p>
-          <a:p>
-            <a:pPr lvl="1"/>
-            <a:r>
-              <a:rPr lang="en-US" dirty="0"/>
-              <a:t>Structure:</a:t>
-            </a:r>
-          </a:p>
-          <a:p>
-            <a:pPr lvl="2"/>
-            <a:r>
-              <a:rPr lang="en-US" dirty="0"/>
-              <a:t>Controller – C# class</a:t>
-            </a:r>
-          </a:p>
-          <a:p>
-            <a:pPr lvl="2"/>
-            <a:r>
-              <a:rPr lang="en-US" dirty="0"/>
-              <a:t>Model – C# object</a:t>
-            </a:r>
-          </a:p>
-          <a:p>
-            <a:pPr lvl="2"/>
-            <a:r>
-              <a:rPr lang="en-US" dirty="0"/>
-              <a:t>CSHTML – Razor views with HTML/CSS/JS and MVC Helpers</a:t>
+              <a:t>Platforms, Frameworks and Devices oh my…</a:t>
             </a:r>
           </a:p>
         </p:txBody>
@@ -6177,7 +6093,7 @@
     </p:spTree>
     <p:extLst>
       <p:ext uri="{BB962C8B-B14F-4D97-AF65-F5344CB8AC3E}">
-        <p14:creationId xmlns:p14="http://schemas.microsoft.com/office/powerpoint/2010/main" val="3719820613"/>
+        <p14:creationId xmlns:p14="http://schemas.microsoft.com/office/powerpoint/2010/main" val="529241155"/>
       </p:ext>
     </p:extLst>
   </p:cSld>
@@ -6221,7 +6137,7 @@
           <a:p>
             <a:r>
               <a:rPr lang="en-US" dirty="0"/>
-              <a:t>Web Services</a:t>
+              <a:t>Web Applications</a:t>
             </a:r>
           </a:p>
         </p:txBody>
@@ -6243,54 +6159,94 @@
           <a:p>
             <a:r>
               <a:rPr lang="en-US" dirty="0"/>
-              <a:t>Two frameworks: WCF and WebAPI</a:t>
-            </a:r>
-          </a:p>
-          <a:p>
-            <a:r>
-              <a:rPr lang="en-US" dirty="0"/>
-              <a:t>WCF:</a:t>
+              <a:t>Two frameworks: ASP.NET WebForms and ASP.NET MVC</a:t>
+            </a:r>
+          </a:p>
+          <a:p>
+            <a:r>
+              <a:rPr lang="en-US" dirty="0"/>
+              <a:t>WebForms:</a:t>
             </a:r>
           </a:p>
           <a:p>
             <a:pPr lvl="1"/>
             <a:r>
               <a:rPr lang="en-US" dirty="0"/>
-              <a:t>Older, SOAP based framework – lots of configuration needed</a:t>
+              <a:t>Older, but quicker to jump into</a:t>
             </a:r>
           </a:p>
           <a:p>
             <a:pPr lvl="1"/>
             <a:r>
               <a:rPr lang="en-US" dirty="0"/>
-              <a:t>Fun fact: WCF &lt;-&gt; WCF communication auto negotiates to a binary transmission instead of XML</a:t>
-            </a:r>
-          </a:p>
-          <a:p>
-            <a:r>
-              <a:rPr lang="en-US" dirty="0"/>
-              <a:t>WebAPI:</a:t>
+              <a:t>Structure:</a:t>
+            </a:r>
+          </a:p>
+          <a:p>
+            <a:pPr lvl="2"/>
+            <a:r>
+              <a:rPr lang="en-US" dirty="0"/>
+              <a:t>ASPX – Contains your CSS/JS/HTML/Server Controls</a:t>
+            </a:r>
+          </a:p>
+          <a:p>
+            <a:pPr lvl="2"/>
+            <a:r>
+              <a:rPr lang="en-US" dirty="0"/>
+              <a:t>ASPX.CS – Code behind for the page itself</a:t>
+            </a:r>
+          </a:p>
+          <a:p>
+            <a:r>
+              <a:rPr lang="en-US" dirty="0"/>
+              <a:t>MVC</a:t>
             </a:r>
           </a:p>
           <a:p>
             <a:pPr lvl="1"/>
             <a:r>
               <a:rPr lang="en-US" dirty="0"/>
-              <a:t>Newer, REST based framework</a:t>
+              <a:t>Newer, more time to get up and running</a:t>
             </a:r>
           </a:p>
           <a:p>
             <a:pPr lvl="1"/>
             <a:r>
               <a:rPr lang="en-US" dirty="0"/>
-              <a:t>Automatic JSON serialization/deserialization support</a:t>
-            </a:r>
+              <a:t>Mobile and Device specific views as simple as:  </a:t>
+            </a:r>
+            <a:r>
+              <a:rPr lang="en-US" dirty="0" err="1"/>
+              <a:t>Index.mobile.cshtml</a:t>
+            </a:r>
+            <a:endParaRPr lang="en-US" dirty="0"/>
           </a:p>
           <a:p>
             <a:pPr lvl="1"/>
             <a:r>
               <a:rPr lang="en-US" dirty="0"/>
-              <a:t>Can be embedded within an MVC application</a:t>
+              <a:t>Structure:</a:t>
+            </a:r>
+          </a:p>
+          <a:p>
+            <a:pPr lvl="2"/>
+            <a:r>
+              <a:rPr lang="en-US" dirty="0"/>
+              <a:t>Controller – C# class</a:t>
+            </a:r>
+          </a:p>
+          <a:p>
+            <a:pPr lvl="2"/>
+            <a:r>
+              <a:rPr lang="en-US" dirty="0"/>
+              <a:t>Model – C# object</a:t>
+            </a:r>
+          </a:p>
+          <a:p>
+            <a:pPr lvl="2"/>
+            <a:r>
+              <a:rPr lang="en-US" dirty="0"/>
+              <a:t>CSHTML – Razor views with HTML/CSS/JS and MVC Helpers</a:t>
             </a:r>
           </a:p>
         </p:txBody>
@@ -6298,7 +6254,7 @@
     </p:spTree>
     <p:extLst>
       <p:ext uri="{BB962C8B-B14F-4D97-AF65-F5344CB8AC3E}">
-        <p14:creationId xmlns:p14="http://schemas.microsoft.com/office/powerpoint/2010/main" val="2167050894"/>
+        <p14:creationId xmlns:p14="http://schemas.microsoft.com/office/powerpoint/2010/main" val="3719820613"/>
       </p:ext>
     </p:extLst>
   </p:cSld>
@@ -6342,7 +6298,7 @@
           <a:p>
             <a:r>
               <a:rPr lang="en-US" dirty="0"/>
-              <a:t>Desktop Applications</a:t>
+              <a:t>Web Services</a:t>
             </a:r>
           </a:p>
         </p:txBody>
@@ -6364,60 +6320,54 @@
           <a:p>
             <a:r>
               <a:rPr lang="en-US" dirty="0"/>
-              <a:t>Three frameworks: WinForms, WPF and UWP</a:t>
-            </a:r>
-          </a:p>
-          <a:p>
-            <a:r>
-              <a:rPr lang="en-US" dirty="0"/>
-              <a:t>WinForms</a:t>
+              <a:t>Two frameworks: WCF and WebAPI</a:t>
+            </a:r>
+          </a:p>
+          <a:p>
+            <a:r>
+              <a:rPr lang="en-US" dirty="0"/>
+              <a:t>WCF:</a:t>
             </a:r>
           </a:p>
           <a:p>
             <a:pPr lvl="1"/>
             <a:r>
               <a:rPr lang="en-US" dirty="0"/>
-              <a:t>Oldest – drag and drop UI designer, code behind structure similar to WebForms</a:t>
-            </a:r>
-          </a:p>
-          <a:p>
-            <a:r>
-              <a:rPr lang="en-US" dirty="0"/>
-              <a:t>WPF</a:t>
+              <a:t>Older, SOAP based framework – lots of configuration needed</a:t>
             </a:r>
           </a:p>
           <a:p>
             <a:pPr lvl="1"/>
             <a:r>
               <a:rPr lang="en-US" dirty="0"/>
-              <a:t>“Replacement” for WinForms, uses XAML</a:t>
-            </a:r>
-          </a:p>
-          <a:p>
-            <a:r>
-              <a:rPr lang="en-US" dirty="0"/>
-              <a:t>UWP</a:t>
+              <a:t>Fun fact: WCF &lt;-&gt; WCF communication auto negotiates to a binary transmission instead of XML</a:t>
+            </a:r>
+          </a:p>
+          <a:p>
+            <a:r>
+              <a:rPr lang="en-US" dirty="0"/>
+              <a:t>WebAPI:</a:t>
             </a:r>
           </a:p>
           <a:p>
             <a:pPr lvl="1"/>
             <a:r>
               <a:rPr lang="en-US" dirty="0"/>
-              <a:t>Combines a lot of WPF elements such as XAML and overall program structures</a:t>
+              <a:t>Newer, REST based framework</a:t>
             </a:r>
           </a:p>
           <a:p>
             <a:pPr lvl="1"/>
             <a:r>
               <a:rPr lang="en-US" dirty="0"/>
-              <a:t>Main Objective: One binary for Windows 10 desktop, phone, HoloLens, IoT and Xbox One</a:t>
+              <a:t>Automatic JSON serialization/deserialization support</a:t>
             </a:r>
           </a:p>
           <a:p>
             <a:pPr lvl="1"/>
             <a:r>
               <a:rPr lang="en-US" dirty="0"/>
-              <a:t>Access to a lot of APIs and uses the same controls that Windows 10 itself uses</a:t>
+              <a:t>Can be embedded within an MVC application</a:t>
             </a:r>
           </a:p>
         </p:txBody>
@@ -6425,7 +6375,7 @@
     </p:spTree>
     <p:extLst>
       <p:ext uri="{BB962C8B-B14F-4D97-AF65-F5344CB8AC3E}">
-        <p14:creationId xmlns:p14="http://schemas.microsoft.com/office/powerpoint/2010/main" val="3160188398"/>
+        <p14:creationId xmlns:p14="http://schemas.microsoft.com/office/powerpoint/2010/main" val="2167050894"/>
       </p:ext>
     </p:extLst>
   </p:cSld>
@@ -6469,7 +6419,7 @@
           <a:p>
             <a:r>
               <a:rPr lang="en-US" dirty="0"/>
-              <a:t>Games</a:t>
+              <a:t>Desktop Applications</a:t>
             </a:r>
           </a:p>
         </p:txBody>
@@ -6491,89 +6441,60 @@
           <a:p>
             <a:r>
               <a:rPr lang="en-US" dirty="0"/>
-              <a:t>Three major frameworks: </a:t>
-            </a:r>
-            <a:r>
-              <a:rPr lang="en-US" dirty="0" err="1"/>
-              <a:t>MonoGame</a:t>
-            </a:r>
-            <a:r>
-              <a:rPr lang="en-US" dirty="0"/>
-              <a:t>, </a:t>
-            </a:r>
-            <a:r>
-              <a:rPr lang="en-US" dirty="0" err="1"/>
-              <a:t>SharpDX</a:t>
-            </a:r>
-            <a:r>
-              <a:rPr lang="en-US" dirty="0"/>
-              <a:t> and Unity</a:t>
-            </a:r>
-          </a:p>
-          <a:p>
-            <a:r>
-              <a:rPr lang="en-US" dirty="0" err="1"/>
-              <a:t>MonoGame</a:t>
-            </a:r>
-            <a:r>
-              <a:rPr lang="en-US" dirty="0"/>
-              <a:t> (XNA)</a:t>
+              <a:t>Three frameworks: WinForms, WPF and UWP</a:t>
+            </a:r>
+          </a:p>
+          <a:p>
+            <a:r>
+              <a:rPr lang="en-US" dirty="0"/>
+              <a:t>WinForms</a:t>
             </a:r>
           </a:p>
           <a:p>
             <a:pPr lvl="1"/>
             <a:r>
               <a:rPr lang="en-US" dirty="0"/>
-              <a:t>Great for 2D games in particular, supports iOS, Android, Windows Desktop/Phone, Mac OS X, Linux, Xbox One</a:t>
-            </a:r>
-          </a:p>
-          <a:p>
-            <a:r>
-              <a:rPr lang="en-US" dirty="0" err="1"/>
-              <a:t>SharpDX</a:t>
-            </a:r>
-            <a:endParaRPr lang="en-US" dirty="0"/>
+              <a:t>Oldest – drag and drop UI designer, code behind structure similar to WebForms</a:t>
+            </a:r>
+          </a:p>
+          <a:p>
+            <a:r>
+              <a:rPr lang="en-US" dirty="0"/>
+              <a:t>WPF</a:t>
+            </a:r>
           </a:p>
           <a:p>
             <a:pPr lvl="1"/>
             <a:r>
               <a:rPr lang="en-US" dirty="0"/>
-              <a:t>Managed wrapper of the C++ </a:t>
-            </a:r>
-            <a:r>
-              <a:rPr lang="en-US" dirty="0" err="1"/>
-              <a:t>dlls</a:t>
-            </a:r>
-            <a:r>
-              <a:rPr lang="en-US" dirty="0"/>
-              <a:t> providing a C#-like DirectX 9-12+ programming experience</a:t>
+              <a:t>“Replacement” for WinForms, uses XAML</a:t>
+            </a:r>
+          </a:p>
+          <a:p>
+            <a:r>
+              <a:rPr lang="en-US" dirty="0"/>
+              <a:t>UWP</a:t>
             </a:r>
           </a:p>
           <a:p>
             <a:pPr lvl="1"/>
             <a:r>
               <a:rPr lang="en-US" dirty="0"/>
-              <a:t>Deployable to Windows 7 and UWP Platforms</a:t>
-            </a:r>
-          </a:p>
-          <a:p>
-            <a:r>
-              <a:rPr lang="en-US" dirty="0"/>
-              <a:t>Unity</a:t>
+              <a:t>Combines a lot of WPF elements such as XAML and overall program structures</a:t>
             </a:r>
           </a:p>
           <a:p>
             <a:pPr lvl="1"/>
             <a:r>
               <a:rPr lang="en-US" dirty="0"/>
-              <a:t>Based on .NET 3.5</a:t>
+              <a:t>Main Objective: One binary for Windows 10 desktop, phone, HoloLens, IoT and Xbox One</a:t>
             </a:r>
           </a:p>
           <a:p>
             <a:pPr lvl="1"/>
             <a:r>
               <a:rPr lang="en-US" dirty="0"/>
-              <a:t>Quick to get up and running</a:t>
+              <a:t>Access to a lot of APIs and uses the same controls that Windows 10 itself uses</a:t>
             </a:r>
           </a:p>
         </p:txBody>
@@ -6581,7 +6502,7 @@
     </p:spTree>
     <p:extLst>
       <p:ext uri="{BB962C8B-B14F-4D97-AF65-F5344CB8AC3E}">
-        <p14:creationId xmlns:p14="http://schemas.microsoft.com/office/powerpoint/2010/main" val="3059121671"/>
+        <p14:creationId xmlns:p14="http://schemas.microsoft.com/office/powerpoint/2010/main" val="3160188398"/>
       </p:ext>
     </p:extLst>
   </p:cSld>
@@ -6625,7 +6546,7 @@
           <a:p>
             <a:r>
               <a:rPr lang="en-US" dirty="0"/>
-              <a:t>IoT</a:t>
+              <a:t>Games</a:t>
             </a:r>
           </a:p>
         </p:txBody>
@@ -6647,80 +6568,97 @@
           <a:p>
             <a:r>
               <a:rPr lang="en-US" dirty="0"/>
-              <a:t>Two approaches: Windows 10 IoT Core and Linux</a:t>
-            </a:r>
-          </a:p>
-          <a:p>
-            <a:r>
-              <a:rPr lang="en-US" dirty="0"/>
-              <a:t>Windows 10 IoT Core:</a:t>
+              <a:t>Three major frameworks: </a:t>
+            </a:r>
+            <a:r>
+              <a:rPr lang="en-US" dirty="0" err="1"/>
+              <a:t>MonoGame</a:t>
+            </a:r>
+            <a:r>
+              <a:rPr lang="en-US" dirty="0"/>
+              <a:t>, </a:t>
+            </a:r>
+            <a:r>
+              <a:rPr lang="en-US" dirty="0" err="1"/>
+              <a:t>SharpDX</a:t>
+            </a:r>
+            <a:r>
+              <a:rPr lang="en-US" dirty="0"/>
+              <a:t> and Unity</a:t>
+            </a:r>
+          </a:p>
+          <a:p>
+            <a:r>
+              <a:rPr lang="en-US" dirty="0" err="1"/>
+              <a:t>MonoGame</a:t>
+            </a:r>
+            <a:r>
+              <a:rPr lang="en-US" dirty="0"/>
+              <a:t> (XNA)</a:t>
             </a:r>
           </a:p>
           <a:p>
             <a:pPr lvl="1"/>
             <a:r>
               <a:rPr lang="en-US" dirty="0"/>
-              <a:t>RPI 2/3 (ARM), </a:t>
-            </a:r>
+              <a:t>Great for 2D games in particular, supports iOS, Android, Windows Desktop/Phone, Mac OS X, Linux, Xbox One</a:t>
+            </a:r>
+          </a:p>
+          <a:p>
             <a:r>
               <a:rPr lang="en-US" dirty="0" err="1"/>
-              <a:t>DragonBoard</a:t>
-            </a:r>
-            <a:r>
-              <a:rPr lang="en-US" dirty="0"/>
-              <a:t> (ARM), </a:t>
+              <a:t>SharpDX</a:t>
+            </a:r>
+            <a:endParaRPr lang="en-US" dirty="0"/>
+          </a:p>
+          <a:p>
+            <a:pPr lvl="1"/>
+            <a:r>
+              <a:rPr lang="en-US" dirty="0"/>
+              <a:t>Managed wrapper of the C++ </a:t>
             </a:r>
             <a:r>
               <a:rPr lang="en-US" dirty="0" err="1"/>
-              <a:t>MinnowBoard</a:t>
-            </a:r>
-            <a:r>
-              <a:rPr lang="en-US" dirty="0"/>
-              <a:t> (x86)</a:t>
+              <a:t>dlls</a:t>
+            </a:r>
+            <a:r>
+              <a:rPr lang="en-US" dirty="0"/>
+              <a:t> providing a C#-like DirectX 9-12+ programming experience</a:t>
             </a:r>
           </a:p>
           <a:p>
             <a:pPr lvl="1"/>
             <a:r>
               <a:rPr lang="en-US" dirty="0"/>
-              <a:t>Free!</a:t>
+              <a:t>Deployable to Windows 7 and UWP Platforms</a:t>
+            </a:r>
+          </a:p>
+          <a:p>
+            <a:r>
+              <a:rPr lang="en-US" dirty="0"/>
+              <a:t>Unity</a:t>
             </a:r>
           </a:p>
           <a:p>
             <a:pPr lvl="1"/>
             <a:r>
               <a:rPr lang="en-US" dirty="0"/>
-              <a:t>Deploy and debug straight from Visual Studio</a:t>
+              <a:t>Based on .NET 3.5</a:t>
             </a:r>
           </a:p>
           <a:p>
             <a:pPr lvl="1"/>
             <a:r>
               <a:rPr lang="en-US" dirty="0"/>
-              <a:t>UI is done through XAML</a:t>
-            </a:r>
-          </a:p>
-          <a:p>
-            <a:pPr lvl="1"/>
-            <a:r>
-              <a:rPr lang="en-US" dirty="0"/>
-              <a:t>Built in Web Server to manage installed apps and set startup apps</a:t>
-            </a:r>
-          </a:p>
-          <a:p>
-            <a:pPr lvl="1"/>
-            <a:endParaRPr lang="en-US" dirty="0"/>
-          </a:p>
-          <a:p>
-            <a:pPr lvl="1"/>
-            <a:endParaRPr lang="en-US" dirty="0"/>
+              <a:t>Quick to get up and running</a:t>
+            </a:r>
           </a:p>
         </p:txBody>
       </p:sp>
     </p:spTree>
     <p:extLst>
       <p:ext uri="{BB962C8B-B14F-4D97-AF65-F5344CB8AC3E}">
-        <p14:creationId xmlns:p14="http://schemas.microsoft.com/office/powerpoint/2010/main" val="1668230154"/>
+        <p14:creationId xmlns:p14="http://schemas.microsoft.com/office/powerpoint/2010/main" val="3059121671"/>
       </p:ext>
     </p:extLst>
   </p:cSld>
@@ -6764,7 +6702,7 @@
           <a:p>
             <a:r>
               <a:rPr lang="en-US" dirty="0"/>
-              <a:t>Mobile Applications (Xamarin)</a:t>
+              <a:t>IoT</a:t>
             </a:r>
           </a:p>
         </p:txBody>
@@ -6786,98 +6724,69 @@
           <a:p>
             <a:r>
               <a:rPr lang="en-US" dirty="0"/>
-              <a:t>Two paths: “Classic” or “Forms”</a:t>
-            </a:r>
-          </a:p>
-          <a:p>
-            <a:r>
-              <a:rPr lang="en-US" dirty="0"/>
-              <a:t>Classic:</a:t>
+              <a:t>Two approaches: Windows 10 IoT Core and Linux</a:t>
+            </a:r>
+          </a:p>
+          <a:p>
+            <a:r>
+              <a:rPr lang="en-US" dirty="0"/>
+              <a:t>Windows 10 IoT Core:</a:t>
             </a:r>
           </a:p>
           <a:p>
             <a:pPr lvl="1"/>
             <a:r>
               <a:rPr lang="en-US" dirty="0"/>
-              <a:t>More bare metal experience on iOS and Android</a:t>
+              <a:t>RPI 2/3 (ARM), </a:t>
+            </a:r>
+            <a:r>
+              <a:rPr lang="en-US" dirty="0" err="1"/>
+              <a:t>DragonBoard</a:t>
+            </a:r>
+            <a:r>
+              <a:rPr lang="en-US" dirty="0"/>
+              <a:t> (ARM), </a:t>
+            </a:r>
+            <a:r>
+              <a:rPr lang="en-US" dirty="0" err="1"/>
+              <a:t>MinnowBoard</a:t>
+            </a:r>
+            <a:r>
+              <a:rPr lang="en-US" dirty="0"/>
+              <a:t> (x86)</a:t>
             </a:r>
           </a:p>
           <a:p>
             <a:pPr lvl="1"/>
             <a:r>
               <a:rPr lang="en-US" dirty="0"/>
-              <a:t>Less portability of code (UI on iOS is through the </a:t>
-            </a:r>
-            <a:r>
-              <a:rPr lang="en-US" dirty="0" err="1"/>
-              <a:t>Xcode</a:t>
-            </a:r>
-            <a:r>
-              <a:rPr lang="en-US" dirty="0"/>
-              <a:t> Interface Builder for instance)</a:t>
+              <a:t>Free!</a:t>
             </a:r>
           </a:p>
           <a:p>
             <a:pPr lvl="1"/>
             <a:r>
               <a:rPr lang="en-US" dirty="0"/>
-              <a:t>Namespaces are identical to their Objective-C and Java counterparts (NS* for iOS)</a:t>
+              <a:t>Deploy and debug straight from Visual Studio</a:t>
             </a:r>
           </a:p>
           <a:p>
             <a:pPr lvl="1"/>
             <a:r>
               <a:rPr lang="en-US" dirty="0"/>
-              <a:t>Easier/More control over UI</a:t>
-            </a:r>
-          </a:p>
-          <a:p>
-            <a:r>
-              <a:rPr lang="en-US" dirty="0"/>
-              <a:t>Forms</a:t>
+              <a:t>UI is done through XAML</a:t>
             </a:r>
           </a:p>
           <a:p>
             <a:pPr lvl="1"/>
             <a:r>
               <a:rPr lang="en-US" dirty="0"/>
-              <a:t>One codebase for iOS, Android, UWP</a:t>
+              <a:t>Built in Web Server to manage installed apps and set startup apps</a:t>
             </a:r>
           </a:p>
           <a:p>
             <a:pPr lvl="1"/>
-            <a:r>
-              <a:rPr lang="en-US" dirty="0"/>
-              <a:t>Barebones XAML syntax</a:t>
-            </a:r>
-          </a:p>
-          <a:p>
-            <a:pPr lvl="1"/>
-            <a:r>
-              <a:rPr lang="en-US" dirty="0"/>
-              <a:t>Structure:</a:t>
-            </a:r>
-          </a:p>
-          <a:p>
-            <a:pPr lvl="2"/>
-            <a:r>
-              <a:rPr lang="en-US" dirty="0"/>
-              <a:t>One shared project with UI and Business Logic</a:t>
-            </a:r>
-          </a:p>
-          <a:p>
-            <a:pPr lvl="2"/>
-            <a:r>
-              <a:rPr lang="en-US" dirty="0"/>
-              <a:t>One project per platform that references the shared project</a:t>
-            </a:r>
-          </a:p>
-          <a:p>
-            <a:pPr lvl="3"/>
-            <a:r>
-              <a:rPr lang="en-US" dirty="0"/>
-              <a:t>Any platform specific implementations as well</a:t>
-            </a:r>
+            <a:endParaRPr lang="en-US" dirty="0"/>
           </a:p>
           <a:p>
             <a:pPr lvl="1"/>
@@ -6888,7 +6797,7 @@
     </p:spTree>
     <p:extLst>
       <p:ext uri="{BB962C8B-B14F-4D97-AF65-F5344CB8AC3E}">
-        <p14:creationId xmlns:p14="http://schemas.microsoft.com/office/powerpoint/2010/main" val="3848770332"/>
+        <p14:creationId xmlns:p14="http://schemas.microsoft.com/office/powerpoint/2010/main" val="1668230154"/>
       </p:ext>
     </p:extLst>
   </p:cSld>
@@ -6932,7 +6841,7 @@
           <a:p>
             <a:r>
               <a:rPr lang="en-US" dirty="0"/>
-              <a:t>Good Resources to keep learning…</a:t>
+              <a:t>Mobile Applications (Xamarin)</a:t>
             </a:r>
           </a:p>
         </p:txBody>
@@ -6954,148 +6863,101 @@
           <a:p>
             <a:r>
               <a:rPr lang="en-US" dirty="0"/>
-              <a:t>Channel 9 (</a:t>
-            </a:r>
-            <a:r>
-              <a:rPr lang="en-US" dirty="0">
-                <a:hlinkClick r:id="rId2"/>
-              </a:rPr>
-              <a:t>https://channel9.msdn.com</a:t>
-            </a:r>
-            <a:r>
-              <a:rPr lang="en-US" dirty="0"/>
-              <a:t>)</a:t>
-            </a:r>
-          </a:p>
-          <a:p>
-            <a:r>
-              <a:rPr lang="en-US" dirty="0"/>
-              <a:t>Microsoft Virtual Academy (</a:t>
-            </a:r>
-            <a:r>
-              <a:rPr lang="en-US" dirty="0">
-                <a:hlinkClick r:id="rId3"/>
-              </a:rPr>
-              <a:t>https://mva.microsoft.com</a:t>
-            </a:r>
-            <a:r>
-              <a:rPr lang="en-US" dirty="0"/>
-              <a:t>)</a:t>
-            </a:r>
-          </a:p>
-          <a:p>
-            <a:r>
-              <a:rPr lang="en-US" dirty="0"/>
-              <a:t>My GitHub (</a:t>
-            </a:r>
-            <a:r>
-              <a:rPr lang="en-US" dirty="0">
-                <a:hlinkClick r:id="rId4"/>
-              </a:rPr>
-              <a:t>https://github.com/jcapellman</a:t>
-            </a:r>
-            <a:r>
-              <a:rPr lang="en-US" dirty="0"/>
-              <a:t>)</a:t>
-            </a:r>
-          </a:p>
-          <a:p>
-            <a:r>
-              <a:rPr lang="en-US" dirty="0"/>
-              <a:t>Xamarin Guides (</a:t>
-            </a:r>
-            <a:r>
-              <a:rPr lang="en-US" dirty="0">
-                <a:hlinkClick r:id="rId5"/>
-              </a:rPr>
-              <a:t>https://developer.xamarin.com/guides/</a:t>
-            </a:r>
-            <a:r>
-              <a:rPr lang="en-US" dirty="0"/>
-              <a:t>)</a:t>
-            </a:r>
-          </a:p>
-          <a:p>
-            <a:r>
-              <a:rPr lang="en-US" dirty="0"/>
-              <a:t>Windows Developer (</a:t>
-            </a:r>
-            <a:r>
-              <a:rPr lang="en-US" dirty="0">
-                <a:hlinkClick r:id="rId6"/>
-              </a:rPr>
-              <a:t>https://developer.microsoft.com</a:t>
-            </a:r>
-            <a:r>
-              <a:rPr lang="en-US" dirty="0"/>
-              <a:t>)</a:t>
-            </a:r>
-          </a:p>
-          <a:p>
-            <a:r>
-              <a:rPr lang="en-US" dirty="0"/>
-              <a:t>Jumping into UWP Dev on your Xbox One (</a:t>
-            </a:r>
-            <a:r>
-              <a:rPr lang="en-US" dirty="0">
-                <a:hlinkClick r:id="rId7"/>
-              </a:rPr>
-              <a:t>https://developer.microsoft.com/en-us/windows/apps/uwp-on-xbox</a:t>
-            </a:r>
-            <a:r>
-              <a:rPr lang="en-US" dirty="0"/>
-              <a:t>)</a:t>
-            </a:r>
-          </a:p>
-          <a:p>
-            <a:r>
-              <a:rPr lang="en-US" dirty="0"/>
-              <a:t>Windows 10 IoT (</a:t>
-            </a:r>
-            <a:r>
-              <a:rPr lang="en-US" dirty="0">
-                <a:hlinkClick r:id="rId8"/>
-              </a:rPr>
-              <a:t>https://developer.microsoft.com/en-us/windows/iot</a:t>
-            </a:r>
-            <a:r>
-              <a:rPr lang="en-US" dirty="0"/>
-              <a:t>)</a:t>
-            </a:r>
-          </a:p>
-          <a:p>
+              <a:t>Two paths: “Classic” or “Forms”</a:t>
+            </a:r>
+          </a:p>
+          <a:p>
+            <a:r>
+              <a:rPr lang="en-US" dirty="0"/>
+              <a:t>Classic:</a:t>
+            </a:r>
+          </a:p>
+          <a:p>
+            <a:pPr lvl="1"/>
+            <a:r>
+              <a:rPr lang="en-US" dirty="0"/>
+              <a:t>More bare metal experience on iOS and Android</a:t>
+            </a:r>
+          </a:p>
+          <a:p>
+            <a:pPr lvl="1"/>
+            <a:r>
+              <a:rPr lang="en-US" dirty="0"/>
+              <a:t>Less portability of code (UI on iOS is through the </a:t>
+            </a:r>
             <a:r>
               <a:rPr lang="en-US" dirty="0" err="1"/>
-              <a:t>GrovePi</a:t>
-            </a:r>
-            <a:r>
-              <a:rPr lang="en-US" dirty="0"/>
-              <a:t> IoT Library (</a:t>
-            </a:r>
-            <a:r>
-              <a:rPr lang="en-US" dirty="0">
-                <a:hlinkClick r:id="rId9"/>
-              </a:rPr>
-              <a:t>https://github.com/WillEastbury/GrovePi</a:t>
-            </a:r>
-            <a:r>
-              <a:rPr lang="en-US" dirty="0"/>
-              <a:t>)</a:t>
-            </a:r>
-          </a:p>
-          <a:p>
-            <a:endParaRPr lang="en-US" dirty="0"/>
-          </a:p>
-          <a:p>
-            <a:endParaRPr lang="en-US" dirty="0"/>
-          </a:p>
-          <a:p>
-            <a:endParaRPr lang="en-US" dirty="0"/>
-          </a:p>
-          <a:p>
-            <a:pPr marL="0" indent="0">
-              <a:buNone/>
-            </a:pPr>
+              <a:t>Xcode</a:t>
+            </a:r>
+            <a:r>
+              <a:rPr lang="en-US" dirty="0"/>
+              <a:t> Interface Builder for instance)</a:t>
+            </a:r>
+          </a:p>
+          <a:p>
+            <a:pPr lvl="1"/>
+            <a:r>
+              <a:rPr lang="en-US" dirty="0"/>
+              <a:t>Namespaces are identical to their Objective-C and Java counterparts (NS* for iOS)</a:t>
+            </a:r>
+          </a:p>
+          <a:p>
+            <a:pPr lvl="1"/>
+            <a:r>
+              <a:rPr lang="en-US" dirty="0"/>
+              <a:t>Easier/More control over UI</a:t>
+            </a:r>
+          </a:p>
+          <a:p>
+            <a:r>
+              <a:rPr lang="en-US" dirty="0"/>
+              <a:t>Forms</a:t>
+            </a:r>
+          </a:p>
+          <a:p>
+            <a:pPr lvl="1"/>
+            <a:r>
+              <a:rPr lang="en-US" dirty="0"/>
+              <a:t>One codebase for iOS, Android, UWP</a:t>
+            </a:r>
+          </a:p>
+          <a:p>
+            <a:pPr lvl="1"/>
+            <a:r>
+              <a:rPr lang="en-US" dirty="0"/>
+              <a:t>Barebones XAML syntax</a:t>
+            </a:r>
+          </a:p>
+          <a:p>
+            <a:pPr lvl="1"/>
+            <a:r>
+              <a:rPr lang="en-US" dirty="0"/>
+              <a:t>Structure:</a:t>
+            </a:r>
+          </a:p>
+          <a:p>
+            <a:pPr lvl="2"/>
+            <a:r>
+              <a:rPr lang="en-US" dirty="0"/>
+              <a:t>One shared project with UI and Business Logic</a:t>
+            </a:r>
+          </a:p>
+          <a:p>
+            <a:pPr lvl="2"/>
+            <a:r>
+              <a:rPr lang="en-US" dirty="0"/>
+              <a:t>One project per platform that references the shared project</a:t>
+            </a:r>
+          </a:p>
+          <a:p>
+            <a:pPr lvl="3"/>
+            <a:r>
+              <a:rPr lang="en-US" dirty="0"/>
+              <a:t>Any platform specific implementations as well</a:t>
+            </a:r>
+          </a:p>
+          <a:p>
+            <a:pPr lvl="1"/>
             <a:endParaRPr lang="en-US" dirty="0"/>
           </a:p>
         </p:txBody>
@@ -7103,7 +6965,7 @@
     </p:spTree>
     <p:extLst>
       <p:ext uri="{BB962C8B-B14F-4D97-AF65-F5344CB8AC3E}">
-        <p14:creationId xmlns:p14="http://schemas.microsoft.com/office/powerpoint/2010/main" val="4290554313"/>
+        <p14:creationId xmlns:p14="http://schemas.microsoft.com/office/powerpoint/2010/main" val="3848770332"/>
       </p:ext>
     </p:extLst>
   </p:cSld>
@@ -7212,6 +7074,221 @@
     <p:extLst>
       <p:ext uri="{BB962C8B-B14F-4D97-AF65-F5344CB8AC3E}">
         <p14:creationId xmlns:p14="http://schemas.microsoft.com/office/powerpoint/2010/main" val="335537273"/>
+      </p:ext>
+    </p:extLst>
+  </p:cSld>
+  <p:clrMapOvr>
+    <a:masterClrMapping/>
+  </p:clrMapOvr>
+</p:sld>
+</file>
+
+<file path=ppt/slides/slide20.xml><?xml version="1.0" encoding="utf-8"?>
+<p:sld xmlns:a="http://schemas.openxmlformats.org/drawingml/2006/main" xmlns:r="http://schemas.openxmlformats.org/officeDocument/2006/relationships" xmlns:p="http://schemas.openxmlformats.org/presentationml/2006/main">
+  <p:cSld>
+    <p:spTree>
+      <p:nvGrpSpPr>
+        <p:cNvPr id="1" name=""/>
+        <p:cNvGrpSpPr/>
+        <p:nvPr/>
+      </p:nvGrpSpPr>
+      <p:grpSpPr>
+        <a:xfrm>
+          <a:off x="0" y="0"/>
+          <a:ext cx="0" cy="0"/>
+          <a:chOff x="0" y="0"/>
+          <a:chExt cx="0" cy="0"/>
+        </a:xfrm>
+      </p:grpSpPr>
+      <p:sp>
+        <p:nvSpPr>
+          <p:cNvPr id="2" name="Title 1"/>
+          <p:cNvSpPr>
+            <a:spLocks noGrp="1"/>
+          </p:cNvSpPr>
+          <p:nvPr>
+            <p:ph type="title"/>
+          </p:nvPr>
+        </p:nvSpPr>
+        <p:spPr/>
+        <p:txBody>
+          <a:bodyPr/>
+          <a:lstStyle/>
+          <a:p>
+            <a:r>
+              <a:rPr lang="en-US" dirty="0"/>
+              <a:t>Good Resources to keep learning…</a:t>
+            </a:r>
+          </a:p>
+        </p:txBody>
+      </p:sp>
+      <p:sp>
+        <p:nvSpPr>
+          <p:cNvPr id="3" name="Content Placeholder 2"/>
+          <p:cNvSpPr>
+            <a:spLocks noGrp="1"/>
+          </p:cNvSpPr>
+          <p:nvPr>
+            <p:ph idx="1"/>
+          </p:nvPr>
+        </p:nvSpPr>
+        <p:spPr/>
+        <p:txBody>
+          <a:bodyPr/>
+          <a:lstStyle/>
+          <a:p>
+            <a:r>
+              <a:rPr lang="en-US" dirty="0"/>
+              <a:t>Channel 9 (</a:t>
+            </a:r>
+            <a:r>
+              <a:rPr lang="en-US" dirty="0">
+                <a:hlinkClick r:id="rId2"/>
+              </a:rPr>
+              <a:t>https://channel9.msdn.com</a:t>
+            </a:r>
+            <a:r>
+              <a:rPr lang="en-US" dirty="0"/>
+              <a:t>)</a:t>
+            </a:r>
+          </a:p>
+          <a:p>
+            <a:r>
+              <a:rPr lang="en-US" dirty="0"/>
+              <a:t>Microsoft Virtual Academy (</a:t>
+            </a:r>
+            <a:r>
+              <a:rPr lang="en-US" dirty="0">
+                <a:hlinkClick r:id="rId3"/>
+              </a:rPr>
+              <a:t>https://mva.microsoft.com</a:t>
+            </a:r>
+            <a:r>
+              <a:rPr lang="en-US" dirty="0"/>
+              <a:t>)</a:t>
+            </a:r>
+          </a:p>
+          <a:p>
+            <a:r>
+              <a:rPr lang="en-US" dirty="0"/>
+              <a:t>My GitHub (</a:t>
+            </a:r>
+            <a:r>
+              <a:rPr lang="en-US" dirty="0">
+                <a:hlinkClick r:id="rId4"/>
+              </a:rPr>
+              <a:t>https://github.com/jcapellman</a:t>
+            </a:r>
+            <a:r>
+              <a:rPr lang="en-US" dirty="0"/>
+              <a:t>)</a:t>
+            </a:r>
+          </a:p>
+          <a:p>
+            <a:r>
+              <a:rPr lang="en-US" dirty="0"/>
+              <a:t>Xamarin Guides (</a:t>
+            </a:r>
+            <a:r>
+              <a:rPr lang="en-US" dirty="0">
+                <a:hlinkClick r:id="rId5"/>
+              </a:rPr>
+              <a:t>https://developer.xamarin.com/guides/</a:t>
+            </a:r>
+            <a:r>
+              <a:rPr lang="en-US" dirty="0"/>
+              <a:t>)</a:t>
+            </a:r>
+          </a:p>
+          <a:p>
+            <a:r>
+              <a:rPr lang="en-US" dirty="0"/>
+              <a:t>Windows Developer (</a:t>
+            </a:r>
+            <a:r>
+              <a:rPr lang="en-US" dirty="0">
+                <a:hlinkClick r:id="rId6"/>
+              </a:rPr>
+              <a:t>https://developer.microsoft.com</a:t>
+            </a:r>
+            <a:r>
+              <a:rPr lang="en-US" dirty="0"/>
+              <a:t>)</a:t>
+            </a:r>
+          </a:p>
+          <a:p>
+            <a:r>
+              <a:rPr lang="en-US" dirty="0"/>
+              <a:t>Jumping into UWP Dev on your Xbox One (</a:t>
+            </a:r>
+            <a:r>
+              <a:rPr lang="en-US" dirty="0">
+                <a:hlinkClick r:id="rId7"/>
+              </a:rPr>
+              <a:t>https://developer.microsoft.com/en-us/windows/apps/uwp-on-xbox</a:t>
+            </a:r>
+            <a:r>
+              <a:rPr lang="en-US" dirty="0"/>
+              <a:t>)</a:t>
+            </a:r>
+          </a:p>
+          <a:p>
+            <a:r>
+              <a:rPr lang="en-US" dirty="0"/>
+              <a:t>Windows 10 IoT (</a:t>
+            </a:r>
+            <a:r>
+              <a:rPr lang="en-US" dirty="0">
+                <a:hlinkClick r:id="rId8"/>
+              </a:rPr>
+              <a:t>https://developer.microsoft.com/en-us/windows/iot</a:t>
+            </a:r>
+            <a:r>
+              <a:rPr lang="en-US" dirty="0"/>
+              <a:t>)</a:t>
+            </a:r>
+          </a:p>
+          <a:p>
+            <a:r>
+              <a:rPr lang="en-US" dirty="0" err="1"/>
+              <a:t>GrovePi</a:t>
+            </a:r>
+            <a:r>
+              <a:rPr lang="en-US" dirty="0"/>
+              <a:t> IoT Library (</a:t>
+            </a:r>
+            <a:r>
+              <a:rPr lang="en-US" dirty="0">
+                <a:hlinkClick r:id="rId9"/>
+              </a:rPr>
+              <a:t>https://github.com/WillEastbury/GrovePi</a:t>
+            </a:r>
+            <a:r>
+              <a:rPr lang="en-US" dirty="0"/>
+              <a:t>)</a:t>
+            </a:r>
+          </a:p>
+          <a:p>
+            <a:endParaRPr lang="en-US" dirty="0"/>
+          </a:p>
+          <a:p>
+            <a:endParaRPr lang="en-US" dirty="0"/>
+          </a:p>
+          <a:p>
+            <a:endParaRPr lang="en-US" dirty="0"/>
+          </a:p>
+          <a:p>
+            <a:pPr marL="0" indent="0">
+              <a:buNone/>
+            </a:pPr>
+            <a:endParaRPr lang="en-US" dirty="0"/>
+          </a:p>
+        </p:txBody>
+      </p:sp>
+    </p:spTree>
+    <p:extLst>
+      <p:ext uri="{BB962C8B-B14F-4D97-AF65-F5344CB8AC3E}">
+        <p14:creationId xmlns:p14="http://schemas.microsoft.com/office/powerpoint/2010/main" val="4290554313"/>
       </p:ext>
     </p:extLst>
   </p:cSld>

</xml_diff>

<commit_message>
Added: .NET Native slide
</commit_message>
<xml_diff>
--- a/C Sharp Ecosystem - 2.3.2017/Csharp.pptx
+++ b/C Sharp Ecosystem - 2.3.2017/Csharp.pptx
@@ -5,7 +5,7 @@
     <p:sldMasterId id="2147483660" r:id="rId1"/>
   </p:sldMasterIdLst>
   <p:notesMasterIdLst>
-    <p:notesMasterId r:id="rId22"/>
+    <p:notesMasterId r:id="rId23"/>
   </p:notesMasterIdLst>
   <p:sldIdLst>
     <p:sldId id="256" r:id="rId2"/>
@@ -20,14 +20,15 @@
     <p:sldId id="297" r:id="rId11"/>
     <p:sldId id="299" r:id="rId12"/>
     <p:sldId id="298" r:id="rId13"/>
-    <p:sldId id="275" r:id="rId14"/>
-    <p:sldId id="291" r:id="rId15"/>
-    <p:sldId id="292" r:id="rId16"/>
-    <p:sldId id="293" r:id="rId17"/>
-    <p:sldId id="294" r:id="rId18"/>
-    <p:sldId id="295" r:id="rId19"/>
-    <p:sldId id="296" r:id="rId20"/>
-    <p:sldId id="285" r:id="rId21"/>
+    <p:sldId id="300" r:id="rId14"/>
+    <p:sldId id="275" r:id="rId15"/>
+    <p:sldId id="291" r:id="rId16"/>
+    <p:sldId id="292" r:id="rId17"/>
+    <p:sldId id="293" r:id="rId18"/>
+    <p:sldId id="294" r:id="rId19"/>
+    <p:sldId id="295" r:id="rId20"/>
+    <p:sldId id="296" r:id="rId21"/>
+    <p:sldId id="285" r:id="rId22"/>
   </p:sldIdLst>
   <p:sldSz cx="12192000" cy="6858000"/>
   <p:notesSz cx="6858000" cy="9144000"/>
@@ -5998,7 +5999,7 @@
           <a:graphicData uri="http://schemas.openxmlformats.org/presentationml/2006/ole">
             <mc:AlternateContent xmlns:mc="http://schemas.openxmlformats.org/markup-compatibility/2006">
               <mc:Choice xmlns:v="urn:schemas-microsoft-com:vml" Requires="v">
-                <p:oleObj spid="_x0000_s1030" name="Image" r:id="rId3" imgW="10679040" imgH="6234840" progId="Photoshop.Image.18">
+                <p:oleObj spid="_x0000_s1034" name="Image" r:id="rId3" imgW="10679040" imgH="6234840" progId="Photoshop.Image.18">
                   <p:embed/>
                 </p:oleObj>
               </mc:Choice>
@@ -6073,27 +6074,94 @@
             <p:ph type="title"/>
           </p:nvPr>
         </p:nvSpPr>
-        <p:spPr>
-          <a:xfrm>
-            <a:off x="744445" y="2806411"/>
-            <a:ext cx="9404351" cy="754063"/>
-          </a:xfrm>
-        </p:spPr>
+        <p:spPr/>
         <p:txBody>
           <a:bodyPr/>
           <a:lstStyle/>
           <a:p>
             <a:r>
               <a:rPr lang="en-US" dirty="0"/>
-              <a:t>Platforms, Frameworks and Devices oh my…</a:t>
-            </a:r>
+              <a:t>.NET Native (NGEN with a Turbo)</a:t>
+            </a:r>
+          </a:p>
+        </p:txBody>
+      </p:sp>
+      <p:sp>
+        <p:nvSpPr>
+          <p:cNvPr id="3" name="Content Placeholder 2"/>
+          <p:cNvSpPr>
+            <a:spLocks noGrp="1"/>
+          </p:cNvSpPr>
+          <p:nvPr>
+            <p:ph idx="1"/>
+          </p:nvPr>
+        </p:nvSpPr>
+        <p:spPr/>
+        <p:txBody>
+          <a:bodyPr/>
+          <a:lstStyle/>
+          <a:p>
+            <a:r>
+              <a:rPr lang="en-US" dirty="0"/>
+              <a:t>Only on Universal Windows Projects</a:t>
+            </a:r>
+          </a:p>
+          <a:p>
+            <a:r>
+              <a:rPr lang="en-US" dirty="0"/>
+              <a:t>Typical path:</a:t>
+            </a:r>
+          </a:p>
+          <a:p>
+            <a:pPr lvl="1"/>
+            <a:r>
+              <a:rPr lang="en-US" dirty="0"/>
+              <a:t>C# -&gt; JIT -&gt; IL</a:t>
+            </a:r>
+          </a:p>
+          <a:p>
+            <a:r>
+              <a:rPr lang="en-US" dirty="0"/>
+              <a:t>.NET Native path:</a:t>
+            </a:r>
+          </a:p>
+          <a:p>
+            <a:pPr lvl="1"/>
+            <a:r>
+              <a:rPr lang="en-US" dirty="0"/>
+              <a:t>C# -&gt; IL -&gt; Native</a:t>
+            </a:r>
+          </a:p>
+          <a:p>
+            <a:r>
+              <a:rPr lang="en-US" dirty="0"/>
+              <a:t>Common Issues:</a:t>
+            </a:r>
+          </a:p>
+          <a:p>
+            <a:pPr lvl="1"/>
+            <a:r>
+              <a:rPr lang="en-US" dirty="0"/>
+              <a:t>Reflection</a:t>
+            </a:r>
+          </a:p>
+          <a:p>
+            <a:pPr lvl="1"/>
+            <a:r>
+              <a:rPr lang="en-US" dirty="0"/>
+              <a:t>Serialization/Deserialization</a:t>
+            </a:r>
+          </a:p>
+          <a:p>
+            <a:pPr lvl="1"/>
+            <a:endParaRPr lang="en-US" dirty="0"/>
           </a:p>
         </p:txBody>
       </p:sp>
     </p:spTree>
     <p:extLst>
       <p:ext uri="{BB962C8B-B14F-4D97-AF65-F5344CB8AC3E}">
-        <p14:creationId xmlns:p14="http://schemas.microsoft.com/office/powerpoint/2010/main" val="529241155"/>
+        <p14:creationId xmlns:p14="http://schemas.microsoft.com/office/powerpoint/2010/main" val="4195573919"/>
       </p:ext>
     </p:extLst>
   </p:cSld>
@@ -6130,123 +6198,19 @@
             <p:ph type="title"/>
           </p:nvPr>
         </p:nvSpPr>
-        <p:spPr/>
+        <p:spPr>
+          <a:xfrm>
+            <a:off x="744445" y="2806411"/>
+            <a:ext cx="9404351" cy="754063"/>
+          </a:xfrm>
+        </p:spPr>
         <p:txBody>
           <a:bodyPr/>
           <a:lstStyle/>
           <a:p>
             <a:r>
               <a:rPr lang="en-US" dirty="0"/>
-              <a:t>Web Applications</a:t>
-            </a:r>
-          </a:p>
-        </p:txBody>
-      </p:sp>
-      <p:sp>
-        <p:nvSpPr>
-          <p:cNvPr id="3" name="Content Placeholder 2"/>
-          <p:cNvSpPr>
-            <a:spLocks noGrp="1"/>
-          </p:cNvSpPr>
-          <p:nvPr>
-            <p:ph idx="1"/>
-          </p:nvPr>
-        </p:nvSpPr>
-        <p:spPr/>
-        <p:txBody>
-          <a:bodyPr/>
-          <a:lstStyle/>
-          <a:p>
-            <a:r>
-              <a:rPr lang="en-US" dirty="0"/>
-              <a:t>Two frameworks: ASP.NET WebForms and ASP.NET MVC</a:t>
-            </a:r>
-          </a:p>
-          <a:p>
-            <a:r>
-              <a:rPr lang="en-US" dirty="0"/>
-              <a:t>WebForms:</a:t>
-            </a:r>
-          </a:p>
-          <a:p>
-            <a:pPr lvl="1"/>
-            <a:r>
-              <a:rPr lang="en-US" dirty="0"/>
-              <a:t>Older, but quicker to jump into</a:t>
-            </a:r>
-          </a:p>
-          <a:p>
-            <a:pPr lvl="1"/>
-            <a:r>
-              <a:rPr lang="en-US" dirty="0"/>
-              <a:t>Structure:</a:t>
-            </a:r>
-          </a:p>
-          <a:p>
-            <a:pPr lvl="2"/>
-            <a:r>
-              <a:rPr lang="en-US" dirty="0"/>
-              <a:t>ASPX – Contains your CSS/JS/HTML/Server Controls</a:t>
-            </a:r>
-          </a:p>
-          <a:p>
-            <a:pPr lvl="2"/>
-            <a:r>
-              <a:rPr lang="en-US" dirty="0"/>
-              <a:t>ASPX.CS – Code behind for the page itself</a:t>
-            </a:r>
-          </a:p>
-          <a:p>
-            <a:r>
-              <a:rPr lang="en-US" dirty="0"/>
-              <a:t>MVC</a:t>
-            </a:r>
-          </a:p>
-          <a:p>
-            <a:pPr lvl="1"/>
-            <a:r>
-              <a:rPr lang="en-US" dirty="0"/>
-              <a:t>Newer, more time to get up and running</a:t>
-            </a:r>
-          </a:p>
-          <a:p>
-            <a:pPr lvl="1"/>
-            <a:r>
-              <a:rPr lang="en-US" dirty="0"/>
-              <a:t>Mobile and Device specific views as simple as:  </a:t>
-            </a:r>
-            <a:r>
-              <a:rPr lang="en-US" dirty="0" err="1"/>
-              <a:t>Index.mobile.cshtml</a:t>
-            </a:r>
-            <a:endParaRPr lang="en-US" dirty="0"/>
-          </a:p>
-          <a:p>
-            <a:pPr lvl="1"/>
-            <a:r>
-              <a:rPr lang="en-US" dirty="0"/>
-              <a:t>Structure:</a:t>
-            </a:r>
-          </a:p>
-          <a:p>
-            <a:pPr lvl="2"/>
-            <a:r>
-              <a:rPr lang="en-US" dirty="0"/>
-              <a:t>Controller – C# class</a:t>
-            </a:r>
-          </a:p>
-          <a:p>
-            <a:pPr lvl="2"/>
-            <a:r>
-              <a:rPr lang="en-US" dirty="0"/>
-              <a:t>Model – C# object</a:t>
-            </a:r>
-          </a:p>
-          <a:p>
-            <a:pPr lvl="2"/>
-            <a:r>
-              <a:rPr lang="en-US" dirty="0"/>
-              <a:t>CSHTML – Razor views with HTML/CSS/JS and MVC Helpers</a:t>
+              <a:t>Platforms, Frameworks and Devices oh my…</a:t>
             </a:r>
           </a:p>
         </p:txBody>
@@ -6254,7 +6218,7 @@
     </p:spTree>
     <p:extLst>
       <p:ext uri="{BB962C8B-B14F-4D97-AF65-F5344CB8AC3E}">
-        <p14:creationId xmlns:p14="http://schemas.microsoft.com/office/powerpoint/2010/main" val="3719820613"/>
+        <p14:creationId xmlns:p14="http://schemas.microsoft.com/office/powerpoint/2010/main" val="529241155"/>
       </p:ext>
     </p:extLst>
   </p:cSld>
@@ -6298,7 +6262,7 @@
           <a:p>
             <a:r>
               <a:rPr lang="en-US" dirty="0"/>
-              <a:t>Web Services</a:t>
+              <a:t>Web Applications</a:t>
             </a:r>
           </a:p>
         </p:txBody>
@@ -6320,54 +6284,94 @@
           <a:p>
             <a:r>
               <a:rPr lang="en-US" dirty="0"/>
-              <a:t>Two frameworks: WCF and WebAPI</a:t>
-            </a:r>
-          </a:p>
-          <a:p>
-            <a:r>
-              <a:rPr lang="en-US" dirty="0"/>
-              <a:t>WCF:</a:t>
+              <a:t>Two frameworks: ASP.NET WebForms and ASP.NET MVC</a:t>
+            </a:r>
+          </a:p>
+          <a:p>
+            <a:r>
+              <a:rPr lang="en-US" dirty="0"/>
+              <a:t>WebForms:</a:t>
             </a:r>
           </a:p>
           <a:p>
             <a:pPr lvl="1"/>
             <a:r>
               <a:rPr lang="en-US" dirty="0"/>
-              <a:t>Older, SOAP based framework – lots of configuration needed</a:t>
+              <a:t>Older, but quicker to jump into</a:t>
             </a:r>
           </a:p>
           <a:p>
             <a:pPr lvl="1"/>
             <a:r>
               <a:rPr lang="en-US" dirty="0"/>
-              <a:t>Fun fact: WCF &lt;-&gt; WCF communication auto negotiates to a binary transmission instead of XML</a:t>
-            </a:r>
-          </a:p>
-          <a:p>
-            <a:r>
-              <a:rPr lang="en-US" dirty="0"/>
-              <a:t>WebAPI:</a:t>
+              <a:t>Structure:</a:t>
+            </a:r>
+          </a:p>
+          <a:p>
+            <a:pPr lvl="2"/>
+            <a:r>
+              <a:rPr lang="en-US" dirty="0"/>
+              <a:t>ASPX – Contains your CSS/JS/HTML/Server Controls</a:t>
+            </a:r>
+          </a:p>
+          <a:p>
+            <a:pPr lvl="2"/>
+            <a:r>
+              <a:rPr lang="en-US" dirty="0"/>
+              <a:t>ASPX.CS – Code behind for the page itself</a:t>
+            </a:r>
+          </a:p>
+          <a:p>
+            <a:r>
+              <a:rPr lang="en-US" dirty="0"/>
+              <a:t>MVC</a:t>
             </a:r>
           </a:p>
           <a:p>
             <a:pPr lvl="1"/>
             <a:r>
               <a:rPr lang="en-US" dirty="0"/>
-              <a:t>Newer, REST based framework</a:t>
+              <a:t>Newer, more time to get up and running</a:t>
             </a:r>
           </a:p>
           <a:p>
             <a:pPr lvl="1"/>
             <a:r>
               <a:rPr lang="en-US" dirty="0"/>
-              <a:t>Automatic JSON serialization/deserialization support</a:t>
-            </a:r>
+              <a:t>Mobile and Device specific views as simple as:  </a:t>
+            </a:r>
+            <a:r>
+              <a:rPr lang="en-US" dirty="0" err="1"/>
+              <a:t>Index.mobile.cshtml</a:t>
+            </a:r>
+            <a:endParaRPr lang="en-US" dirty="0"/>
           </a:p>
           <a:p>
             <a:pPr lvl="1"/>
             <a:r>
               <a:rPr lang="en-US" dirty="0"/>
-              <a:t>Can be embedded within an MVC application</a:t>
+              <a:t>Structure:</a:t>
+            </a:r>
+          </a:p>
+          <a:p>
+            <a:pPr lvl="2"/>
+            <a:r>
+              <a:rPr lang="en-US" dirty="0"/>
+              <a:t>Controller – C# class</a:t>
+            </a:r>
+          </a:p>
+          <a:p>
+            <a:pPr lvl="2"/>
+            <a:r>
+              <a:rPr lang="en-US" dirty="0"/>
+              <a:t>Model – C# object</a:t>
+            </a:r>
+          </a:p>
+          <a:p>
+            <a:pPr lvl="2"/>
+            <a:r>
+              <a:rPr lang="en-US" dirty="0"/>
+              <a:t>CSHTML – Razor views with HTML/CSS/JS and MVC Helpers</a:t>
             </a:r>
           </a:p>
         </p:txBody>
@@ -6375,7 +6379,7 @@
     </p:spTree>
     <p:extLst>
       <p:ext uri="{BB962C8B-B14F-4D97-AF65-F5344CB8AC3E}">
-        <p14:creationId xmlns:p14="http://schemas.microsoft.com/office/powerpoint/2010/main" val="2167050894"/>
+        <p14:creationId xmlns:p14="http://schemas.microsoft.com/office/powerpoint/2010/main" val="3719820613"/>
       </p:ext>
     </p:extLst>
   </p:cSld>
@@ -6419,7 +6423,7 @@
           <a:p>
             <a:r>
               <a:rPr lang="en-US" dirty="0"/>
-              <a:t>Desktop Applications</a:t>
+              <a:t>Web Services</a:t>
             </a:r>
           </a:p>
         </p:txBody>
@@ -6441,60 +6445,54 @@
           <a:p>
             <a:r>
               <a:rPr lang="en-US" dirty="0"/>
-              <a:t>Three frameworks: WinForms, WPF and UWP</a:t>
-            </a:r>
-          </a:p>
-          <a:p>
-            <a:r>
-              <a:rPr lang="en-US" dirty="0"/>
-              <a:t>WinForms</a:t>
+              <a:t>Two frameworks: WCF and WebAPI</a:t>
+            </a:r>
+          </a:p>
+          <a:p>
+            <a:r>
+              <a:rPr lang="en-US" dirty="0"/>
+              <a:t>WCF:</a:t>
             </a:r>
           </a:p>
           <a:p>
             <a:pPr lvl="1"/>
             <a:r>
               <a:rPr lang="en-US" dirty="0"/>
-              <a:t>Oldest – drag and drop UI designer, code behind structure similar to WebForms</a:t>
-            </a:r>
-          </a:p>
-          <a:p>
-            <a:r>
-              <a:rPr lang="en-US" dirty="0"/>
-              <a:t>WPF</a:t>
+              <a:t>Older, SOAP based framework – lots of configuration needed</a:t>
             </a:r>
           </a:p>
           <a:p>
             <a:pPr lvl="1"/>
             <a:r>
               <a:rPr lang="en-US" dirty="0"/>
-              <a:t>“Replacement” for WinForms, uses XAML</a:t>
-            </a:r>
-          </a:p>
-          <a:p>
-            <a:r>
-              <a:rPr lang="en-US" dirty="0"/>
-              <a:t>UWP</a:t>
+              <a:t>Fun fact: WCF &lt;-&gt; WCF communication auto negotiates to a binary transmission instead of XML</a:t>
+            </a:r>
+          </a:p>
+          <a:p>
+            <a:r>
+              <a:rPr lang="en-US" dirty="0"/>
+              <a:t>WebAPI:</a:t>
             </a:r>
           </a:p>
           <a:p>
             <a:pPr lvl="1"/>
             <a:r>
               <a:rPr lang="en-US" dirty="0"/>
-              <a:t>Combines a lot of WPF elements such as XAML and overall program structures</a:t>
+              <a:t>Newer, REST based framework</a:t>
             </a:r>
           </a:p>
           <a:p>
             <a:pPr lvl="1"/>
             <a:r>
               <a:rPr lang="en-US" dirty="0"/>
-              <a:t>Main Objective: One binary for Windows 10 desktop, phone, HoloLens, IoT and Xbox One</a:t>
+              <a:t>Automatic JSON serialization/deserialization support</a:t>
             </a:r>
           </a:p>
           <a:p>
             <a:pPr lvl="1"/>
             <a:r>
               <a:rPr lang="en-US" dirty="0"/>
-              <a:t>Access to a lot of APIs and uses the same controls that Windows 10 itself uses</a:t>
+              <a:t>Can be embedded within an MVC application</a:t>
             </a:r>
           </a:p>
         </p:txBody>
@@ -6502,7 +6500,7 @@
     </p:spTree>
     <p:extLst>
       <p:ext uri="{BB962C8B-B14F-4D97-AF65-F5344CB8AC3E}">
-        <p14:creationId xmlns:p14="http://schemas.microsoft.com/office/powerpoint/2010/main" val="3160188398"/>
+        <p14:creationId xmlns:p14="http://schemas.microsoft.com/office/powerpoint/2010/main" val="2167050894"/>
       </p:ext>
     </p:extLst>
   </p:cSld>
@@ -6546,7 +6544,7 @@
           <a:p>
             <a:r>
               <a:rPr lang="en-US" dirty="0"/>
-              <a:t>Games</a:t>
+              <a:t>Desktop Applications</a:t>
             </a:r>
           </a:p>
         </p:txBody>
@@ -6568,89 +6566,60 @@
           <a:p>
             <a:r>
               <a:rPr lang="en-US" dirty="0"/>
-              <a:t>Three major frameworks: </a:t>
-            </a:r>
-            <a:r>
-              <a:rPr lang="en-US" dirty="0" err="1"/>
-              <a:t>MonoGame</a:t>
-            </a:r>
-            <a:r>
-              <a:rPr lang="en-US" dirty="0"/>
-              <a:t>, </a:t>
-            </a:r>
-            <a:r>
-              <a:rPr lang="en-US" dirty="0" err="1"/>
-              <a:t>SharpDX</a:t>
-            </a:r>
-            <a:r>
-              <a:rPr lang="en-US" dirty="0"/>
-              <a:t> and Unity</a:t>
-            </a:r>
-          </a:p>
-          <a:p>
-            <a:r>
-              <a:rPr lang="en-US" dirty="0" err="1"/>
-              <a:t>MonoGame</a:t>
-            </a:r>
-            <a:r>
-              <a:rPr lang="en-US" dirty="0"/>
-              <a:t> (XNA)</a:t>
+              <a:t>Three frameworks: WinForms, WPF and UWP</a:t>
+            </a:r>
+          </a:p>
+          <a:p>
+            <a:r>
+              <a:rPr lang="en-US" dirty="0"/>
+              <a:t>WinForms</a:t>
             </a:r>
           </a:p>
           <a:p>
             <a:pPr lvl="1"/>
             <a:r>
               <a:rPr lang="en-US" dirty="0"/>
-              <a:t>Great for 2D games in particular, supports iOS, Android, Windows Desktop/Phone, Mac OS X, Linux, Xbox One</a:t>
-            </a:r>
-          </a:p>
-          <a:p>
-            <a:r>
-              <a:rPr lang="en-US" dirty="0" err="1"/>
-              <a:t>SharpDX</a:t>
-            </a:r>
-            <a:endParaRPr lang="en-US" dirty="0"/>
+              <a:t>Oldest – drag and drop UI designer, code behind structure similar to WebForms</a:t>
+            </a:r>
+          </a:p>
+          <a:p>
+            <a:r>
+              <a:rPr lang="en-US" dirty="0"/>
+              <a:t>WPF</a:t>
+            </a:r>
           </a:p>
           <a:p>
             <a:pPr lvl="1"/>
             <a:r>
               <a:rPr lang="en-US" dirty="0"/>
-              <a:t>Managed wrapper of the C++ </a:t>
-            </a:r>
-            <a:r>
-              <a:rPr lang="en-US" dirty="0" err="1"/>
-              <a:t>dlls</a:t>
-            </a:r>
-            <a:r>
-              <a:rPr lang="en-US" dirty="0"/>
-              <a:t> providing a C#-like DirectX 9-12+ programming experience</a:t>
+              <a:t>“Replacement” for WinForms, uses XAML</a:t>
+            </a:r>
+          </a:p>
+          <a:p>
+            <a:r>
+              <a:rPr lang="en-US" dirty="0"/>
+              <a:t>UWP</a:t>
             </a:r>
           </a:p>
           <a:p>
             <a:pPr lvl="1"/>
             <a:r>
               <a:rPr lang="en-US" dirty="0"/>
-              <a:t>Deployable to Windows 7 and UWP Platforms</a:t>
-            </a:r>
-          </a:p>
-          <a:p>
-            <a:r>
-              <a:rPr lang="en-US" dirty="0"/>
-              <a:t>Unity</a:t>
+              <a:t>Combines a lot of WPF elements such as XAML and overall program structures</a:t>
             </a:r>
           </a:p>
           <a:p>
             <a:pPr lvl="1"/>
             <a:r>
               <a:rPr lang="en-US" dirty="0"/>
-              <a:t>Based on .NET 3.5</a:t>
+              <a:t>Main Objective: One binary for Windows 10 desktop, phone, HoloLens, IoT and Xbox One</a:t>
             </a:r>
           </a:p>
           <a:p>
             <a:pPr lvl="1"/>
             <a:r>
               <a:rPr lang="en-US" dirty="0"/>
-              <a:t>Quick to get up and running</a:t>
+              <a:t>Access to a lot of APIs and uses the same controls that Windows 10 itself uses</a:t>
             </a:r>
           </a:p>
         </p:txBody>
@@ -6658,7 +6627,7 @@
     </p:spTree>
     <p:extLst>
       <p:ext uri="{BB962C8B-B14F-4D97-AF65-F5344CB8AC3E}">
-        <p14:creationId xmlns:p14="http://schemas.microsoft.com/office/powerpoint/2010/main" val="3059121671"/>
+        <p14:creationId xmlns:p14="http://schemas.microsoft.com/office/powerpoint/2010/main" val="3160188398"/>
       </p:ext>
     </p:extLst>
   </p:cSld>
@@ -6702,7 +6671,7 @@
           <a:p>
             <a:r>
               <a:rPr lang="en-US" dirty="0"/>
-              <a:t>IoT</a:t>
+              <a:t>Games</a:t>
             </a:r>
           </a:p>
         </p:txBody>
@@ -6724,80 +6693,97 @@
           <a:p>
             <a:r>
               <a:rPr lang="en-US" dirty="0"/>
-              <a:t>Two approaches: Windows 10 IoT Core and Linux</a:t>
-            </a:r>
-          </a:p>
-          <a:p>
-            <a:r>
-              <a:rPr lang="en-US" dirty="0"/>
-              <a:t>Windows 10 IoT Core:</a:t>
+              <a:t>Three major frameworks: </a:t>
+            </a:r>
+            <a:r>
+              <a:rPr lang="en-US" dirty="0" err="1"/>
+              <a:t>MonoGame</a:t>
+            </a:r>
+            <a:r>
+              <a:rPr lang="en-US" dirty="0"/>
+              <a:t>, </a:t>
+            </a:r>
+            <a:r>
+              <a:rPr lang="en-US" dirty="0" err="1"/>
+              <a:t>SharpDX</a:t>
+            </a:r>
+            <a:r>
+              <a:rPr lang="en-US" dirty="0"/>
+              <a:t> and Unity</a:t>
+            </a:r>
+          </a:p>
+          <a:p>
+            <a:r>
+              <a:rPr lang="en-US" dirty="0" err="1"/>
+              <a:t>MonoGame</a:t>
+            </a:r>
+            <a:r>
+              <a:rPr lang="en-US" dirty="0"/>
+              <a:t> (XNA)</a:t>
             </a:r>
           </a:p>
           <a:p>
             <a:pPr lvl="1"/>
             <a:r>
               <a:rPr lang="en-US" dirty="0"/>
-              <a:t>RPI 2/3 (ARM), </a:t>
-            </a:r>
+              <a:t>Great for 2D games in particular, supports iOS, Android, Windows Desktop/Phone, Mac OS X, Linux, Xbox One</a:t>
+            </a:r>
+          </a:p>
+          <a:p>
             <a:r>
               <a:rPr lang="en-US" dirty="0" err="1"/>
-              <a:t>DragonBoard</a:t>
-            </a:r>
-            <a:r>
-              <a:rPr lang="en-US" dirty="0"/>
-              <a:t> (ARM), </a:t>
+              <a:t>SharpDX</a:t>
+            </a:r>
+            <a:endParaRPr lang="en-US" dirty="0"/>
+          </a:p>
+          <a:p>
+            <a:pPr lvl="1"/>
+            <a:r>
+              <a:rPr lang="en-US" dirty="0"/>
+              <a:t>Managed wrapper of the C++ </a:t>
             </a:r>
             <a:r>
               <a:rPr lang="en-US" dirty="0" err="1"/>
-              <a:t>MinnowBoard</a:t>
-            </a:r>
-            <a:r>
-              <a:rPr lang="en-US" dirty="0"/>
-              <a:t> (x86)</a:t>
+              <a:t>dlls</a:t>
+            </a:r>
+            <a:r>
+              <a:rPr lang="en-US" dirty="0"/>
+              <a:t> providing a C#-like DirectX 9-12+ programming experience</a:t>
             </a:r>
           </a:p>
           <a:p>
             <a:pPr lvl="1"/>
             <a:r>
               <a:rPr lang="en-US" dirty="0"/>
-              <a:t>Free!</a:t>
+              <a:t>Deployable to Windows 7 and UWP Platforms</a:t>
+            </a:r>
+          </a:p>
+          <a:p>
+            <a:r>
+              <a:rPr lang="en-US" dirty="0"/>
+              <a:t>Unity</a:t>
             </a:r>
           </a:p>
           <a:p>
             <a:pPr lvl="1"/>
             <a:r>
               <a:rPr lang="en-US" dirty="0"/>
-              <a:t>Deploy and debug straight from Visual Studio</a:t>
+              <a:t>Based on .NET 3.5</a:t>
             </a:r>
           </a:p>
           <a:p>
             <a:pPr lvl="1"/>
             <a:r>
               <a:rPr lang="en-US" dirty="0"/>
-              <a:t>UI is done through XAML</a:t>
-            </a:r>
-          </a:p>
-          <a:p>
-            <a:pPr lvl="1"/>
-            <a:r>
-              <a:rPr lang="en-US" dirty="0"/>
-              <a:t>Built in Web Server to manage installed apps and set startup apps</a:t>
-            </a:r>
-          </a:p>
-          <a:p>
-            <a:pPr lvl="1"/>
-            <a:endParaRPr lang="en-US" dirty="0"/>
-          </a:p>
-          <a:p>
-            <a:pPr lvl="1"/>
-            <a:endParaRPr lang="en-US" dirty="0"/>
+              <a:t>Quick to get up and running</a:t>
+            </a:r>
           </a:p>
         </p:txBody>
       </p:sp>
     </p:spTree>
     <p:extLst>
       <p:ext uri="{BB962C8B-B14F-4D97-AF65-F5344CB8AC3E}">
-        <p14:creationId xmlns:p14="http://schemas.microsoft.com/office/powerpoint/2010/main" val="1668230154"/>
+        <p14:creationId xmlns:p14="http://schemas.microsoft.com/office/powerpoint/2010/main" val="3059121671"/>
       </p:ext>
     </p:extLst>
   </p:cSld>
@@ -6841,7 +6827,7 @@
           <a:p>
             <a:r>
               <a:rPr lang="en-US" dirty="0"/>
-              <a:t>Mobile Applications (Xamarin)</a:t>
+              <a:t>IoT</a:t>
             </a:r>
           </a:p>
         </p:txBody>
@@ -6863,98 +6849,69 @@
           <a:p>
             <a:r>
               <a:rPr lang="en-US" dirty="0"/>
-              <a:t>Two paths: “Classic” or “Forms”</a:t>
-            </a:r>
-          </a:p>
-          <a:p>
-            <a:r>
-              <a:rPr lang="en-US" dirty="0"/>
-              <a:t>Classic:</a:t>
+              <a:t>Two approaches: Windows 10 IoT Core and Linux</a:t>
+            </a:r>
+          </a:p>
+          <a:p>
+            <a:r>
+              <a:rPr lang="en-US" dirty="0"/>
+              <a:t>Windows 10 IoT Core:</a:t>
             </a:r>
           </a:p>
           <a:p>
             <a:pPr lvl="1"/>
             <a:r>
               <a:rPr lang="en-US" dirty="0"/>
-              <a:t>More bare metal experience on iOS and Android</a:t>
+              <a:t>RPI 2/3 (ARM), </a:t>
+            </a:r>
+            <a:r>
+              <a:rPr lang="en-US" dirty="0" err="1"/>
+              <a:t>DragonBoard</a:t>
+            </a:r>
+            <a:r>
+              <a:rPr lang="en-US" dirty="0"/>
+              <a:t> (ARM), </a:t>
+            </a:r>
+            <a:r>
+              <a:rPr lang="en-US" dirty="0" err="1"/>
+              <a:t>MinnowBoard</a:t>
+            </a:r>
+            <a:r>
+              <a:rPr lang="en-US" dirty="0"/>
+              <a:t> (x86)</a:t>
             </a:r>
           </a:p>
           <a:p>
             <a:pPr lvl="1"/>
             <a:r>
               <a:rPr lang="en-US" dirty="0"/>
-              <a:t>Less portability of code (UI on iOS is through the </a:t>
-            </a:r>
-            <a:r>
-              <a:rPr lang="en-US" dirty="0" err="1"/>
-              <a:t>Xcode</a:t>
-            </a:r>
-            <a:r>
-              <a:rPr lang="en-US" dirty="0"/>
-              <a:t> Interface Builder for instance)</a:t>
+              <a:t>Free!</a:t>
             </a:r>
           </a:p>
           <a:p>
             <a:pPr lvl="1"/>
             <a:r>
               <a:rPr lang="en-US" dirty="0"/>
-              <a:t>Namespaces are identical to their Objective-C and Java counterparts (NS* for iOS)</a:t>
+              <a:t>Deploy and debug straight from Visual Studio</a:t>
             </a:r>
           </a:p>
           <a:p>
             <a:pPr lvl="1"/>
             <a:r>
               <a:rPr lang="en-US" dirty="0"/>
-              <a:t>Easier/More control over UI</a:t>
-            </a:r>
-          </a:p>
-          <a:p>
-            <a:r>
-              <a:rPr lang="en-US" dirty="0"/>
-              <a:t>Forms</a:t>
+              <a:t>UI is done through XAML</a:t>
             </a:r>
           </a:p>
           <a:p>
             <a:pPr lvl="1"/>
             <a:r>
               <a:rPr lang="en-US" dirty="0"/>
-              <a:t>One codebase for iOS, Android, UWP</a:t>
+              <a:t>Built in Web Server to manage installed apps and set startup apps</a:t>
             </a:r>
           </a:p>
           <a:p>
             <a:pPr lvl="1"/>
-            <a:r>
-              <a:rPr lang="en-US" dirty="0"/>
-              <a:t>Barebones XAML syntax</a:t>
-            </a:r>
-          </a:p>
-          <a:p>
-            <a:pPr lvl="1"/>
-            <a:r>
-              <a:rPr lang="en-US" dirty="0"/>
-              <a:t>Structure:</a:t>
-            </a:r>
-          </a:p>
-          <a:p>
-            <a:pPr lvl="2"/>
-            <a:r>
-              <a:rPr lang="en-US" dirty="0"/>
-              <a:t>One shared project with UI and Business Logic</a:t>
-            </a:r>
-          </a:p>
-          <a:p>
-            <a:pPr lvl="2"/>
-            <a:r>
-              <a:rPr lang="en-US" dirty="0"/>
-              <a:t>One project per platform that references the shared project</a:t>
-            </a:r>
-          </a:p>
-          <a:p>
-            <a:pPr lvl="3"/>
-            <a:r>
-              <a:rPr lang="en-US" dirty="0"/>
-              <a:t>Any platform specific implementations as well</a:t>
-            </a:r>
+            <a:endParaRPr lang="en-US" dirty="0"/>
           </a:p>
           <a:p>
             <a:pPr lvl="1"/>
@@ -6965,7 +6922,7 @@
     </p:spTree>
     <p:extLst>
       <p:ext uri="{BB962C8B-B14F-4D97-AF65-F5344CB8AC3E}">
-        <p14:creationId xmlns:p14="http://schemas.microsoft.com/office/powerpoint/2010/main" val="3848770332"/>
+        <p14:creationId xmlns:p14="http://schemas.microsoft.com/office/powerpoint/2010/main" val="1668230154"/>
       </p:ext>
     </p:extLst>
   </p:cSld>
@@ -7084,6 +7041,174 @@
 </file>
 
 <file path=ppt/slides/slide20.xml><?xml version="1.0" encoding="utf-8"?>
+<p:sld xmlns:a="http://schemas.openxmlformats.org/drawingml/2006/main" xmlns:r="http://schemas.openxmlformats.org/officeDocument/2006/relationships" xmlns:p="http://schemas.openxmlformats.org/presentationml/2006/main">
+  <p:cSld>
+    <p:spTree>
+      <p:nvGrpSpPr>
+        <p:cNvPr id="1" name=""/>
+        <p:cNvGrpSpPr/>
+        <p:nvPr/>
+      </p:nvGrpSpPr>
+      <p:grpSpPr>
+        <a:xfrm>
+          <a:off x="0" y="0"/>
+          <a:ext cx="0" cy="0"/>
+          <a:chOff x="0" y="0"/>
+          <a:chExt cx="0" cy="0"/>
+        </a:xfrm>
+      </p:grpSpPr>
+      <p:sp>
+        <p:nvSpPr>
+          <p:cNvPr id="2" name="Title 1"/>
+          <p:cNvSpPr>
+            <a:spLocks noGrp="1"/>
+          </p:cNvSpPr>
+          <p:nvPr>
+            <p:ph type="title"/>
+          </p:nvPr>
+        </p:nvSpPr>
+        <p:spPr/>
+        <p:txBody>
+          <a:bodyPr/>
+          <a:lstStyle/>
+          <a:p>
+            <a:r>
+              <a:rPr lang="en-US" dirty="0"/>
+              <a:t>Mobile Applications (Xamarin)</a:t>
+            </a:r>
+          </a:p>
+        </p:txBody>
+      </p:sp>
+      <p:sp>
+        <p:nvSpPr>
+          <p:cNvPr id="3" name="Content Placeholder 2"/>
+          <p:cNvSpPr>
+            <a:spLocks noGrp="1"/>
+          </p:cNvSpPr>
+          <p:nvPr>
+            <p:ph idx="1"/>
+          </p:nvPr>
+        </p:nvSpPr>
+        <p:spPr/>
+        <p:txBody>
+          <a:bodyPr/>
+          <a:lstStyle/>
+          <a:p>
+            <a:r>
+              <a:rPr lang="en-US" dirty="0"/>
+              <a:t>Two paths: “Classic” or “Forms”</a:t>
+            </a:r>
+          </a:p>
+          <a:p>
+            <a:r>
+              <a:rPr lang="en-US" dirty="0"/>
+              <a:t>Classic:</a:t>
+            </a:r>
+          </a:p>
+          <a:p>
+            <a:pPr lvl="1"/>
+            <a:r>
+              <a:rPr lang="en-US" dirty="0"/>
+              <a:t>More bare metal experience on iOS and Android</a:t>
+            </a:r>
+          </a:p>
+          <a:p>
+            <a:pPr lvl="1"/>
+            <a:r>
+              <a:rPr lang="en-US" dirty="0"/>
+              <a:t>Less portability of code (UI on iOS is through the </a:t>
+            </a:r>
+            <a:r>
+              <a:rPr lang="en-US" dirty="0" err="1"/>
+              <a:t>Xcode</a:t>
+            </a:r>
+            <a:r>
+              <a:rPr lang="en-US" dirty="0"/>
+              <a:t> Interface Builder for instance)</a:t>
+            </a:r>
+          </a:p>
+          <a:p>
+            <a:pPr lvl="1"/>
+            <a:r>
+              <a:rPr lang="en-US" dirty="0"/>
+              <a:t>Namespaces are identical to their Objective-C and Java counterparts (NS* for iOS)</a:t>
+            </a:r>
+          </a:p>
+          <a:p>
+            <a:pPr lvl="1"/>
+            <a:r>
+              <a:rPr lang="en-US" dirty="0"/>
+              <a:t>Easier/More control over UI</a:t>
+            </a:r>
+          </a:p>
+          <a:p>
+            <a:r>
+              <a:rPr lang="en-US" dirty="0"/>
+              <a:t>Forms</a:t>
+            </a:r>
+          </a:p>
+          <a:p>
+            <a:pPr lvl="1"/>
+            <a:r>
+              <a:rPr lang="en-US" dirty="0"/>
+              <a:t>One codebase for iOS, Android, UWP</a:t>
+            </a:r>
+          </a:p>
+          <a:p>
+            <a:pPr lvl="1"/>
+            <a:r>
+              <a:rPr lang="en-US" dirty="0"/>
+              <a:t>Barebones XAML syntax</a:t>
+            </a:r>
+          </a:p>
+          <a:p>
+            <a:pPr lvl="1"/>
+            <a:r>
+              <a:rPr lang="en-US" dirty="0"/>
+              <a:t>Structure:</a:t>
+            </a:r>
+          </a:p>
+          <a:p>
+            <a:pPr lvl="2"/>
+            <a:r>
+              <a:rPr lang="en-US" dirty="0"/>
+              <a:t>One shared project with UI and Business Logic</a:t>
+            </a:r>
+          </a:p>
+          <a:p>
+            <a:pPr lvl="2"/>
+            <a:r>
+              <a:rPr lang="en-US" dirty="0"/>
+              <a:t>One project per platform that references the shared project</a:t>
+            </a:r>
+          </a:p>
+          <a:p>
+            <a:pPr lvl="3"/>
+            <a:r>
+              <a:rPr lang="en-US" dirty="0"/>
+              <a:t>Any platform specific implementations as well</a:t>
+            </a:r>
+          </a:p>
+          <a:p>
+            <a:pPr lvl="1"/>
+            <a:endParaRPr lang="en-US" dirty="0"/>
+          </a:p>
+        </p:txBody>
+      </p:sp>
+    </p:spTree>
+    <p:extLst>
+      <p:ext uri="{BB962C8B-B14F-4D97-AF65-F5344CB8AC3E}">
+        <p14:creationId xmlns:p14="http://schemas.microsoft.com/office/powerpoint/2010/main" val="3848770332"/>
+      </p:ext>
+    </p:extLst>
+  </p:cSld>
+  <p:clrMapOvr>
+    <a:masterClrMapping/>
+  </p:clrMapOvr>
+</p:sld>
+</file>
+
+<file path=ppt/slides/slide21.xml><?xml version="1.0" encoding="utf-8"?>
 <p:sld xmlns:a="http://schemas.openxmlformats.org/drawingml/2006/main" xmlns:r="http://schemas.openxmlformats.org/officeDocument/2006/relationships" xmlns:p="http://schemas.openxmlformats.org/presentationml/2006/main">
   <p:cSld>
     <p:spTree>

</xml_diff>